<commit_message>
chapter 9 ready for inspection
</commit_message>
<xml_diff>
--- a/figures/dotnetLightNew.pptx
+++ b/figures/dotnetLightNew.pptx
@@ -3038,8 +3038,13 @@
           <a:p>
             <a:r>
               <a:rPr lang="en-DK" dirty="0"/>
-              <a:t>Program.fs</a:t>
-            </a:r>
+              <a:t>Program</a:t>
+            </a:r>
+            <a:r>
+              <a:rPr lang="en-DK"/>
+              <a:t>.fsx</a:t>
+            </a:r>
+            <a:endParaRPr lang="en-DK" dirty="0"/>
           </a:p>
         </p:txBody>
       </p:sp>

</xml_diff>